<commit_message>
added stuff to P3, fixed P1 title
</commit_message>
<xml_diff>
--- a/Präsentationen/PT1.pptx
+++ b/Präsentationen/PT1.pptx
@@ -3782,8 +3782,16 @@
               <a:rPr lang="de-DE" dirty="0" smtClean="0"/>
             </a:br>
             <a:r>
+              <a:rPr lang="de-DE" smtClean="0"/>
+              <a:t>Part </a:t>
+            </a:r>
+            <a:r>
+              <a:rPr lang="de-DE" smtClean="0"/>
+              <a:t>I: </a:t>
+            </a:r>
+            <a:r>
               <a:rPr lang="de-DE" dirty="0" smtClean="0"/>
-              <a:t>Part III: Rechtliche Grundlagen</a:t>
+              <a:t>Rechtliche Grundlagen</a:t>
             </a:r>
             <a:endParaRPr lang="de-DE" dirty="0"/>
           </a:p>

</xml_diff>